<commit_message>
Updated trainer guide. Began updating the associated presentation.
</commit_message>
<xml_diff>
--- a/Whiteboard design session/WDS trainer presentation - Migrating Oracle to Azure SQL.pptx
+++ b/Whiteboard design session/WDS trainer presentation - Migrating Oracle to Azure SQL.pptx
@@ -227,7 +227,7 @@
           <a:p>
             <a:fld id="{52A13B17-C506-4D51-BB37-16B365906619}" type="datetimeFigureOut">
               <a:rPr lang="en-US" smtClean="0"/>
-              <a:t>8/6/2020</a:t>
+              <a:t>8/30/2021</a:t>
             </a:fld>
             <a:endParaRPr lang="en-US" dirty="0"/>
           </a:p>
@@ -798,7 +798,7 @@
             </a:pPr>
             <a:r>
               <a:rPr lang="en-US" dirty="0"/>
-              <a:t>What will stop us from upgrading our data warehouse to SQL Server 2017 Enterprise?</a:t>
+              <a:t>What will stop us from upgrading our data warehouse to Azure SQL Database or SQL Server 2019 Enterprise?</a:t>
             </a:r>
           </a:p>
           <a:p>
@@ -1429,7 +1429,7 @@
                 <a:ea typeface="+mn-ea"/>
                 <a:cs typeface="+mn-cs"/>
               </a:rPr>
-              <a:t>WWI decided that SQL Server would in fact be the right choice for their platform</a:t>
+              <a:t>WWI decided that Azure SQL Database would in fact be the right choice for their platform</a:t>
             </a:r>
           </a:p>
           <a:p>
@@ -1514,7 +1514,7 @@
                 <a:ea typeface="+mn-ea"/>
                 <a:cs typeface="+mn-cs"/>
               </a:rPr>
-              <a:t>The POC should demonstrate that AlwaysOn Availability Groups will give them the reliability and performance they expected Oracle to deliver for them</a:t>
+              <a:t>The POC should demonstrate that Azure SQL Database will give them the reliability and performance they expected Oracle to deliver for them</a:t>
             </a:r>
           </a:p>
           <a:p>
@@ -1531,7 +1531,7 @@
                 <a:ea typeface="+mn-ea"/>
                 <a:cs typeface="+mn-cs"/>
               </a:rPr>
-              <a:t>They would like to migrate their data warehouse to SQL Server 2017 Enterprise</a:t>
+              <a:t>They would like to migrate their data warehouse to Azure SQL Database</a:t>
             </a:r>
           </a:p>
           <a:p>
@@ -1548,11 +1548,11 @@
                 <a:ea typeface="+mn-ea"/>
                 <a:cs typeface="+mn-cs"/>
               </a:rPr>
-              <a:t>They have decided to host SQL Server 2017 on-premises for the Oracle OLTP replacement, with a possible move to Azure in the future</a:t>
-            </a:r>
-          </a:p>
-          <a:p>
-            <a:pPr marL="171450" lvl="0" indent="-171450" rtl="0">
+              <a:t>POC should include:</a:t>
+            </a:r>
+          </a:p>
+          <a:p>
+            <a:pPr marL="628650" lvl="1" indent="-171450" rtl="0">
               <a:buFont typeface="Arial" panose="020B0604020202020204" pitchFamily="34" charset="0"/>
               <a:buChar char="•"/>
             </a:pPr>
@@ -1565,24 +1565,7 @@
                 <a:ea typeface="+mn-ea"/>
                 <a:cs typeface="+mn-cs"/>
               </a:rPr>
-              <a:t>POC should included:</a:t>
-            </a:r>
-          </a:p>
-          <a:p>
-            <a:pPr marL="628650" lvl="1" indent="-171450" rtl="0">
-              <a:buFont typeface="Arial" panose="020B0604020202020204" pitchFamily="34" charset="0"/>
-              <a:buChar char="•"/>
-            </a:pPr>
-            <a:r>
-              <a:rPr lang="en-US" sz="1200" b="0" i="0" u="none" strike="noStrike" kern="1200" baseline="0" dirty="0">
-                <a:solidFill>
-                  <a:schemeClr val="tx1"/>
-                </a:solidFill>
-                <a:latin typeface="+mn-lt"/>
-                <a:ea typeface="+mn-ea"/>
-                <a:cs typeface="+mn-cs"/>
-              </a:rPr>
-              <a:t>MVC app which changes the connectionString from Oracle to SQL Server in Entity Framework (EF)</a:t>
+              <a:t>MVC app which changes the connectionString from Oracle to Azure SQL Database in Entity Framework Core (EF Core)</a:t>
             </a:r>
           </a:p>
           <a:p>
@@ -1616,7 +1599,7 @@
                 <a:ea typeface="+mn-ea"/>
                 <a:cs typeface="+mn-cs"/>
               </a:rPr>
-              <a:t>Current Oracle database migrated to SQL Server 2017 in a test environment</a:t>
+              <a:t>Current Oracle database migrated to Azure SQL Database in a test environment</a:t>
             </a:r>
           </a:p>
           <a:p>
@@ -1684,11 +1667,11 @@
                 <a:ea typeface="+mn-ea"/>
                 <a:cs typeface="+mn-cs"/>
               </a:rPr>
-              <a:t>SQL Server Stretch Database</a:t>
-            </a:r>
-          </a:p>
-          <a:p>
-            <a:pPr marL="1085850" lvl="2" indent="-171450" rtl="0">
+              <a:t>Failover groups</a:t>
+            </a:r>
+          </a:p>
+          <a:p>
+            <a:pPr marL="628650" lvl="1" indent="-171450" rtl="0">
               <a:buFont typeface="Arial" panose="020B0604020202020204" pitchFamily="34" charset="0"/>
               <a:buChar char="•"/>
             </a:pPr>
@@ -1701,24 +1684,7 @@
                 <a:ea typeface="+mn-ea"/>
                 <a:cs typeface="+mn-cs"/>
               </a:rPr>
-              <a:t>AlwaysOn Availability groups</a:t>
-            </a:r>
-          </a:p>
-          <a:p>
-            <a:pPr marL="628650" lvl="1" indent="-171450" rtl="0">
-              <a:buFont typeface="Arial" panose="020B0604020202020204" pitchFamily="34" charset="0"/>
-              <a:buChar char="•"/>
-            </a:pPr>
-            <a:r>
-              <a:rPr lang="en-US" sz="1200" b="0" i="0" u="none" strike="noStrike" kern="1200" baseline="0" dirty="0">
-                <a:solidFill>
-                  <a:schemeClr val="tx1"/>
-                </a:solidFill>
-                <a:latin typeface="+mn-lt"/>
-                <a:ea typeface="+mn-ea"/>
-                <a:cs typeface="+mn-cs"/>
-              </a:rPr>
-              <a:t>An upgraded data warehouse, using Data Migration Assistant</a:t>
+              <a:t>An upgraded data warehouse, using Azure Database Migration Service</a:t>
             </a:r>
           </a:p>
           <a:p>
@@ -2086,7 +2052,7 @@
                 <a:ea typeface="+mn-ea"/>
                 <a:cs typeface="+mn-cs"/>
               </a:rPr>
-              <a:t>How would you recommend that WWI move their data and schema into SQL Server? What services would you suggest and what are the specific steps they would need to take to prepare the data, to transfer the data, and where would the loaded data land?</a:t>
+              <a:t>How would you recommend that WWI move their data and schema into Azure SQL Database? What services would you suggest and what are the specific steps they would need to take to prepare the data, to transfer the data, and where would the loaded data land?</a:t>
             </a:r>
           </a:p>
           <a:p>
@@ -2114,7 +2080,7 @@
                 <a:ea typeface="+mn-ea"/>
                 <a:cs typeface="+mn-cs"/>
               </a:rPr>
-              <a:t>SQL Server Migration Assistant (SSMA) was specifically created and supported by Microsoft to help Oracle customers move their schema and data over to Microsoft SQL Server</a:t>
+              <a:t>SQL Server Migration Assistant (SSMA) was specifically created and supported by Microsoft to help Oracle customers move their schema and data over to Microsoft SQL Server or Azure SQL Database</a:t>
             </a:r>
           </a:p>
           <a:p>
@@ -2145,7 +2111,7 @@
                 <a:ea typeface="+mn-ea"/>
                 <a:cs typeface="+mn-cs"/>
               </a:rPr>
-              <a:t>First you create a new project. Then you connect to the Oracle source database. Then connect to the SQL Server destination database. Map Oracle schemas to SQL Server schemas. Then you can load the Oracle schemas into the SQL Server schemas. Prior to synchronizing the objects into the SQL Server database, the SSMA for Oracle assemblies must be marked as trusted assemblies, so the synchronization can complete successfully. Once that is completed, synchronize all the objects. Lastly, you can move all the data into SQL Server.</a:t>
+              <a:t>First you create a new project. Then you connect to the Oracle source database. Then connect to the Azure SQL Database or SQL Server destination database. Map Oracle schemas to the target database. Prior to synchronizing the objects into the SQL Server database, the SSMA for Oracle assemblies must be marked as trusted assemblies, so the synchronization can complete successfully. This step is unnecessary for Azure SQL Database migrations. Once that is completed, synchronize all the objects. Lastly, you can move all the data into SQL Server or Azure SQL Database.</a:t>
             </a:r>
           </a:p>
           <a:p>
@@ -2338,7 +2304,7 @@
                 <a:ea typeface="+mn-ea"/>
                 <a:cs typeface="+mn-cs"/>
               </a:rPr>
-              <a:t>A specific product might not be needed, but you might evaluate whether they are using an ORM or not. If they are using Entity Framework, Dapper, or nHibernate, then the application should migrate much more easily.</a:t>
+              <a:t>A specific product might not be needed, but you might evaluate whether they are using an ORM or not. If they are using Entity Framework (Core), Dapper, or nHibernate, then the application should migrate much more easily.</a:t>
             </a:r>
           </a:p>
           <a:p>
@@ -2430,6 +2396,36 @@
               </a:rPr>
               <a:t>For the POC, they are looking to switch the connection string, test several pages related to an order, and get a good idea on the work that would be necessary to get that to work.</a:t>
             </a:r>
+          </a:p>
+          <a:p>
+            <a:pPr marL="171450" lvl="0" indent="-171450">
+              <a:buFont typeface="Arial" panose="020B0604020202020204" pitchFamily="34" charset="0"/>
+              <a:buChar char="•"/>
+            </a:pPr>
+            <a:r>
+              <a:rPr lang="en-US" sz="1200" kern="1200" dirty="0">
+                <a:solidFill>
+                  <a:schemeClr val="tx1"/>
+                </a:solidFill>
+                <a:effectLst/>
+                <a:latin typeface="+mn-lt"/>
+                <a:ea typeface="+mn-ea"/>
+                <a:cs typeface="+mn-cs"/>
+              </a:rPr>
+              <a:t>Use the Microsoft Data Access Migration Toolkit when migrating Java applications from Oracle to SQL Server. VS </a:t>
+            </a:r>
+            <a:r>
+              <a:rPr lang="en-US" sz="1200" kern="1200">
+                <a:solidFill>
+                  <a:schemeClr val="tx1"/>
+                </a:solidFill>
+                <a:effectLst/>
+                <a:latin typeface="+mn-lt"/>
+                <a:ea typeface="+mn-ea"/>
+                <a:cs typeface="+mn-cs"/>
+              </a:rPr>
+              <a:t>Code extension</a:t>
+            </a:r>
             <a:endParaRPr lang="en-US" dirty="0">
               <a:effectLst/>
             </a:endParaRPr>
@@ -2649,14 +2645,20 @@
                 <a:ea typeface="+mn-ea"/>
                 <a:cs typeface="+mn-cs"/>
               </a:rPr>
-              <a:t>JSON data can be stored in a varchar field in SQL Server</a:t>
-            </a:r>
-          </a:p>
-          <a:p>
-            <a:pPr marL="628650" lvl="1" indent="-171450">
-              <a:buFont typeface="Arial" panose="020B0604020202020204" pitchFamily="34" charset="0"/>
-              <a:buChar char="•"/>
-            </a:pPr>
+              <a:t>JSON data can be stored in a </a:t>
+            </a:r>
+            <a:r>
+              <a:rPr lang="en-US" sz="1200" kern="1200" dirty="0" err="1">
+                <a:solidFill>
+                  <a:schemeClr val="tx1"/>
+                </a:solidFill>
+                <a:effectLst/>
+                <a:latin typeface="+mn-lt"/>
+                <a:ea typeface="+mn-ea"/>
+                <a:cs typeface="+mn-cs"/>
+              </a:rPr>
+              <a:t>nvarchar</a:t>
+            </a:r>
             <a:r>
               <a:rPr lang="en-US" sz="1200" kern="1200" dirty="0">
                 <a:solidFill>
@@ -2667,7 +2669,25 @@
                 <a:ea typeface="+mn-ea"/>
                 <a:cs typeface="+mn-cs"/>
               </a:rPr>
-              <a:t>Managed through the JSON functions of SQL Server 2017</a:t>
+              <a:t> field in Azure SQL Database or SQL Server 2019</a:t>
+            </a:r>
+          </a:p>
+          <a:p>
+            <a:pPr marL="628650" lvl="1" indent="-171450">
+              <a:buFont typeface="Arial" panose="020B0604020202020204" pitchFamily="34" charset="0"/>
+              <a:buChar char="•"/>
+            </a:pPr>
+            <a:r>
+              <a:rPr lang="en-US" sz="1200" kern="1200" dirty="0">
+                <a:solidFill>
+                  <a:schemeClr val="tx1"/>
+                </a:solidFill>
+                <a:effectLst/>
+                <a:latin typeface="+mn-lt"/>
+                <a:ea typeface="+mn-ea"/>
+                <a:cs typeface="+mn-cs"/>
+              </a:rPr>
+              <a:t>Managed through the JSON functions of T-SQL</a:t>
             </a:r>
           </a:p>
           <a:p>
@@ -6232,7 +6252,7 @@
                   <a:prstClr val="black"/>
                 </a:solidFill>
               </a:rPr>
-              <a:t>8/6/2020 2:43 PM</a:t>
+              <a:t>8/30/2021 9:36 PM</a:t>
             </a:fld>
             <a:endParaRPr lang="en-US" dirty="0">
               <a:solidFill>
@@ -6538,7 +6558,7 @@
                 <a:latin typeface="+mn-lt"/>
                 <a:cs typeface="Segoe UI" panose="020B0502040204020203" pitchFamily="34" charset="0"/>
               </a:rPr>
-              <a:t>Investigating replacing Oracle with SQL Server</a:t>
+              <a:t>Investigating replacing Oracle with Azure SQL Database</a:t>
             </a:r>
           </a:p>
           <a:p>
@@ -6595,7 +6615,7 @@
                 <a:latin typeface="+mn-lt"/>
                 <a:cs typeface="Segoe UI" panose="020B0502040204020203" pitchFamily="34" charset="0"/>
               </a:rPr>
-              <a:t>Business stake holders have tired of the process and have requested a proof of concept on replacing Oracle with Microsoft SQL Server </a:t>
+              <a:t>Business stake holders have tired of the process and have requested a proof of concept on replacing Oracle with Azure SQL Database</a:t>
             </a:r>
           </a:p>
           <a:p>
@@ -6809,7 +6829,7 @@
                 <a:latin typeface="+mn-lt"/>
                 <a:cs typeface="Segoe UI" panose="020B0502040204020203" pitchFamily="34" charset="0"/>
               </a:rPr>
-              <a:t>The database is used by an online store application, written in ASP.NET MVC</a:t>
+              <a:t>The database is used by an online store application, written in ASP.NET Core MVC</a:t>
             </a:r>
           </a:p>
           <a:p>
@@ -7123,7 +7143,7 @@
                 <a:latin typeface="+mn-lt"/>
                 <a:cs typeface="Segoe UI" panose="020B0502040204020203" pitchFamily="34" charset="0"/>
               </a:rPr>
-              <a:t>Realizes he needs to upgrade to Enterprise Edition and would like to include an upgrade in this POC</a:t>
+              <a:t>Realizes he needs to upgrade to Azure SQL Database or SQL Server Enterprise Edition and would like to include an upgrade in this POC</a:t>
             </a:r>
           </a:p>
         </p:txBody>
@@ -7214,7 +7234,7 @@
             </a:pPr>
             <a:r>
               <a:rPr lang="en-US" dirty="0"/>
-              <a:t>Migrate an existing Oracle database to SQL Server 2017 on-premises, SQL Server 2017 in an Azure VM, or Azure SQL Database</a:t>
+              <a:t>Migrate an existing Oracle database to SQL Server 2019 on-premises, SQL Server 2019 in an Azure VM, or Azure SQL Database</a:t>
             </a:r>
           </a:p>
           <a:p>
@@ -7241,7 +7261,7 @@
             </a:pPr>
             <a:r>
               <a:rPr lang="en-US" dirty="0"/>
-              <a:t>Needs to understand what is involved in migrating the external sales application to SQL Server</a:t>
+              <a:t>Needs to understand what is involved in migrating the external sales application to Azure SQL Database or SQL Server</a:t>
             </a:r>
           </a:p>
           <a:p>
@@ -7278,7 +7298,7 @@
             </a:pPr>
             <a:r>
               <a:rPr lang="en-US" dirty="0"/>
-              <a:t>Upgrade existing data warehouse from SQL Server 2008 Standard Edition to SQL Server 2017 Enterprise Edition to take advantage of some new features:</a:t>
+              <a:t>Upgrade existing data warehouse from SQL Server 2008 Standard Edition to Azure SQL Database or SQL Server 2019 Enterprise Edition to take advantage of some new features:</a:t>
             </a:r>
           </a:p>
           <a:p>
@@ -7604,7 +7624,7 @@
             </a:pPr>
             <a:r>
               <a:rPr lang="en-US" dirty="0"/>
-              <a:t>Do we need to rewrite all of our applications for SQL Server?</a:t>
+              <a:t>Do we need to rewrite all our applications for SQL Server or Azure SQL Database?</a:t>
             </a:r>
           </a:p>
           <a:p>
@@ -7614,7 +7634,7 @@
             </a:pPr>
             <a:r>
               <a:rPr lang="en-US" dirty="0"/>
-              <a:t>Do we need to rewrite all of our reports for SQL Server? </a:t>
+              <a:t>Do we need to rewrite all our reports for SQL Server or Azure SQL Database? </a:t>
             </a:r>
           </a:p>
           <a:p>
@@ -7624,7 +7644,7 @@
             </a:pPr>
             <a:r>
               <a:rPr lang="en-US" dirty="0"/>
-              <a:t>Will our security migrate over from Oracle to SQL Server?  How do we handle security in the new database?</a:t>
+              <a:t>Will our security migrate over from Oracle?  How do we handle security in the new database?</a:t>
             </a:r>
           </a:p>
           <a:p>
@@ -21637,10 +21657,10 @@
       </p:sp>
       <p:pic>
         <p:nvPicPr>
-          <p:cNvPr id="4" name="Picture 3" descr="This solution diagram is divided in to Microsoft Azure, and On Premises. Microsoft Azure includes SQL Server 2017 in a VM as an Always On Secondary, and Azure SQL Data Warehouse for a stretch table. On Premise includes the following elements: API App for vendor connections; Web App for Internet Sales Transactions; ASP.NET Core App for inventory management; SQL Server 2017 OLTP for Always On and JSON store; SSRS 2017 for Reporting of OLTP, Data Warehouse, and Cubes; SSIS 2017 for a Data Warehouse Load; Excel for reporting; SQL Server 2017 Enterprise for a Data Warehouse; and SSAS 2017 for a Data Warehouse. " title="Preferred solution diagram">
+          <p:cNvPr id="5" name="Picture 4">
             <a:extLst>
               <a:ext uri="{FF2B5EF4-FFF2-40B4-BE49-F238E27FC236}">
-                <a16:creationId xmlns:a16="http://schemas.microsoft.com/office/drawing/2014/main" id="{AA575635-8D6F-4258-BD7A-0E428B2D346D}"/>
+                <a16:creationId xmlns:a16="http://schemas.microsoft.com/office/drawing/2014/main" id="{1B124C83-5D73-47BB-A0E3-A18C60C51FA9}"/>
               </a:ext>
             </a:extLst>
           </p:cNvPr>
@@ -21657,8 +21677,8 @@
         </p:blipFill>
         <p:spPr>
           <a:xfrm>
-            <a:off x="1372882" y="1189176"/>
-            <a:ext cx="9446236" cy="5511030"/>
+            <a:off x="1459348" y="1189176"/>
+            <a:ext cx="9273304" cy="5234141"/>
           </a:xfrm>
           <a:prstGeom prst="rect">
             <a:avLst/>
@@ -21932,28 +21952,14 @@
               <a:t>Oracle schema and data movement</a:t>
             </a:r>
           </a:p>
-          <a:p>
-            <a:pPr marL="0" indent="0">
-              <a:buNone/>
-            </a:pPr>
-            <a:r>
-              <a:rPr lang="en-US" sz="3600" dirty="0">
-                <a:solidFill>
-                  <a:schemeClr val="tx1"/>
-                </a:solidFill>
-                <a:latin typeface="+mj-lt"/>
-              </a:rPr>
-              <a:t>(on-premises)</a:t>
-            </a:r>
-          </a:p>
         </p:txBody>
       </p:sp>
       <p:pic>
         <p:nvPicPr>
-          <p:cNvPr id="4" name="Picture 3" descr="Database migration&#10;&#10;An arrow labeled SSMA for Oracle points from an Oracle database icon to a SQL Server 2017 Enterprise icon.">
+          <p:cNvPr id="5" name="Picture 4" descr="Graphical user interface, text&#10;&#10;Description automatically generated">
             <a:extLst>
               <a:ext uri="{FF2B5EF4-FFF2-40B4-BE49-F238E27FC236}">
-                <a16:creationId xmlns:a16="http://schemas.microsoft.com/office/drawing/2014/main" id="{0F371F2A-F8BF-4D85-978B-DDA622BCF6EC}"/>
+                <a16:creationId xmlns:a16="http://schemas.microsoft.com/office/drawing/2014/main" id="{156C5640-82D8-419A-9E6C-D6E60A4E2B40}"/>
               </a:ext>
             </a:extLst>
           </p:cNvPr>
@@ -21963,15 +21969,21 @@
           <p:nvPr/>
         </p:nvPicPr>
         <p:blipFill>
-          <a:blip r:embed="rId3"/>
+          <a:blip r:embed="rId3">
+            <a:extLst>
+              <a:ext uri="{28A0092B-C50C-407E-A947-70E740481C1C}">
+                <a14:useLocalDpi xmlns:a14="http://schemas.microsoft.com/office/drawing/2010/main" val="0"/>
+              </a:ext>
+            </a:extLst>
+          </a:blip>
           <a:stretch>
             <a:fillRect/>
           </a:stretch>
         </p:blipFill>
         <p:spPr>
           <a:xfrm>
-            <a:off x="1071846" y="2842914"/>
-            <a:ext cx="10048306" cy="3803470"/>
+            <a:off x="1627858" y="2135009"/>
+            <a:ext cx="8936284" cy="3749681"/>
           </a:xfrm>
           <a:prstGeom prst="rect">
             <a:avLst/>
@@ -22131,7 +22143,7 @@
                   <a:schemeClr val="tx1"/>
                 </a:solidFill>
               </a:rPr>
-              <a:t>Store, manage, and query JSON with SQL Server 2017</a:t>
+              <a:t>Store, manage, and query JSON with Azure SQL Database or SQL Server 2019</a:t>
             </a:r>
           </a:p>
         </p:txBody>
@@ -22309,7 +22321,7 @@
                 <a:latin typeface="Segoe UI Semilight" panose="020B0402040204020203" pitchFamily="34" charset="0"/>
                 <a:cs typeface="Segoe UI Semilight" panose="020B0402040204020203" pitchFamily="34" charset="0"/>
               </a:rPr>
-              <a:t>In this whiteboard design session, you work with a group to design a proof of concept (POC) for conducting a site analysis for a customer to compare cost, performance, and level of effort required to migrate from Oracle to SQL Server. You evaluate the dependent applications and reports that need to be updated and come up with a migration plan. Also, you review ways to help the customer take advantage of new SQL Server features to improve performance and resiliency, as well as explore ways to migrate from an old version of SQL Server to the latest version and consider the impact of migrating from on-premises to the cloud.</a:t>
+              <a:t>In this whiteboard design session, you work with a group to design a proof of concept (POC) for conducting a site analysis for a customer to compare cost, performance, and level of effort required to migrate from Oracle to Azure SQL Database. You evaluate the dependent applications and reports that need to be updated and come up with a migration plan. Also, you review ways to help the customer take advantage of new Azure SQL Database features to improve performance and resiliency, as well as explore ways to migrate from an old version of SQL Server to the latest version and consider the impact of migrating from on-premises to the cloud.</a:t>
             </a:r>
           </a:p>
           <a:p>
@@ -24805,7 +24817,7 @@
           <a:p>
             <a:r>
               <a:rPr lang="en-US" sz="3900" dirty="0"/>
-              <a:t>Requested POC to replace Oracle with SQL Server</a:t>
+              <a:t>Requested POC to replace Oracle with Azure SQL Database</a:t>
             </a:r>
           </a:p>
           <a:p>
@@ -25451,7 +25463,7 @@
           <a:p>
             <a:r>
               <a:rPr lang="en-US" sz="3600" dirty="0"/>
-              <a:t>Migrate from Oracle to SQL Server 2017</a:t>
+              <a:t>Migrate from Oracle to SQL Server (including Azure SQL Database)</a:t>
             </a:r>
           </a:p>
           <a:p>
@@ -25469,7 +25481,7 @@
           <a:p>
             <a:r>
               <a:rPr lang="en-US" sz="3600" dirty="0"/>
-              <a:t>Upgrade data warehouse to SQL Server 2017 Enterprise Edition</a:t>
+              <a:t>Upgrade data warehouse to Azure SQL Database or SQL Server 2019 Enterprise Edition</a:t>
             </a:r>
           </a:p>
           <a:p>

</xml_diff>

<commit_message>
Final MCW QC updates.
</commit_message>
<xml_diff>
--- a/Whiteboard design session/WDS trainer presentation - Migrating Oracle to Azure SQL.pptx
+++ b/Whiteboard design session/WDS trainer presentation - Migrating Oracle to Azure SQL.pptx
@@ -227,7 +227,7 @@
           <a:p>
             <a:fld id="{52A13B17-C506-4D51-BB37-16B365906619}" type="datetimeFigureOut">
               <a:rPr lang="en-US" smtClean="0"/>
-              <a:t>9/1/2021</a:t>
+              <a:t>9/22/2021</a:t>
             </a:fld>
             <a:endParaRPr lang="en-US" dirty="0"/>
           </a:p>
@@ -6765,7 +6765,7 @@
                   <a:prstClr val="black"/>
                 </a:solidFill>
               </a:rPr>
-              <a:t>9/1/2021 9:57 PM</a:t>
+              <a:t>9/22/2021 5:03 PM</a:t>
             </a:fld>
             <a:endParaRPr lang="en-US" dirty="0">
               <a:solidFill>
@@ -22170,7 +22170,7 @@
       </p:sp>
       <p:pic>
         <p:nvPicPr>
-          <p:cNvPr id="5" name="Picture 4">
+          <p:cNvPr id="5" name="Picture 4" descr="This image demonstrates the Preferred solution architecture for the lab, addressing the OLTP database (Azure SQL Database) and the Data Warehouse (also Azure SQL Database); the replacements for SSIS, SSAS, and SSRS; and connectivity for on-premises resources to access Azure.">
             <a:extLst>
               <a:ext uri="{FF2B5EF4-FFF2-40B4-BE49-F238E27FC236}">
                 <a16:creationId xmlns:a16="http://schemas.microsoft.com/office/drawing/2014/main" id="{1B124C83-5D73-47BB-A0E3-A18C60C51FA9}"/>
@@ -22469,7 +22469,7 @@
       </p:sp>
       <p:pic>
         <p:nvPicPr>
-          <p:cNvPr id="5" name="Picture 4" descr="Graphical user interface, text&#10;&#10;Description automatically generated">
+          <p:cNvPr id="5" name="Picture 4" descr="This image shows the preferred method of using the SQL Server Migration Assistant to migrate from Oracle to Azure SQL Database.">
             <a:extLst>
               <a:ext uri="{FF2B5EF4-FFF2-40B4-BE49-F238E27FC236}">
                 <a16:creationId xmlns:a16="http://schemas.microsoft.com/office/drawing/2014/main" id="{156C5640-82D8-419A-9E6C-D6E60A4E2B40}"/>

</xml_diff>